<commit_message>
project files added and demo slides
</commit_message>
<xml_diff>
--- a/demo/demo.pptx
+++ b/demo/demo.pptx
@@ -6,7 +6,7 @@
     <p:sldMasterId id="2147483659" r:id="rId2"/>
   </p:sldMasterIdLst>
   <p:notesMasterIdLst>
-    <p:notesMasterId r:id="rId12"/>
+    <p:notesMasterId r:id="rId13"/>
   </p:notesMasterIdLst>
   <p:sldIdLst>
     <p:sldId id="256" r:id="rId3"/>
@@ -16,8 +16,9 @@
     <p:sldId id="261" r:id="rId7"/>
     <p:sldId id="262" r:id="rId8"/>
     <p:sldId id="263" r:id="rId9"/>
-    <p:sldId id="264" r:id="rId10"/>
-    <p:sldId id="260" r:id="rId11"/>
+    <p:sldId id="265" r:id="rId10"/>
+    <p:sldId id="264" r:id="rId11"/>
+    <p:sldId id="260" r:id="rId12"/>
   </p:sldIdLst>
   <p:sldSz cx="9144000" cy="5143500" type="screen16x9"/>
   <p:notesSz cx="6858000" cy="9144000"/>
@@ -1566,6 +1567,170 @@
 </p:notes>
 </file>
 
+<file path=ppt/notesSlides/notesSlide10.xml><?xml version="1.0" encoding="utf-8"?>
+<p:notes xmlns:a="http://schemas.openxmlformats.org/drawingml/2006/main" xmlns:r="http://schemas.openxmlformats.org/officeDocument/2006/relationships" xmlns:p="http://schemas.openxmlformats.org/presentationml/2006/main" showMasterSp="0" showMasterPhAnim="0">
+  <p:cSld>
+    <p:spTree>
+      <p:nvGrpSpPr>
+        <p:cNvPr id="1" name="Shape 115"/>
+        <p:cNvGrpSpPr/>
+        <p:nvPr/>
+      </p:nvGrpSpPr>
+      <p:grpSpPr>
+        <a:xfrm>
+          <a:off x="0" y="0"/>
+          <a:ext cx="0" cy="0"/>
+          <a:chOff x="0" y="0"/>
+          <a:chExt cx="0" cy="0"/>
+        </a:xfrm>
+      </p:grpSpPr>
+      <p:sp>
+        <p:nvSpPr>
+          <p:cNvPr id="116" name="Google Shape;116;gf7a5f07be5_0_13:notes"/>
+          <p:cNvSpPr>
+            <a:spLocks noGrp="1" noRot="1" noChangeAspect="1"/>
+          </p:cNvSpPr>
+          <p:nvPr>
+            <p:ph type="sldImg" idx="2"/>
+          </p:nvPr>
+        </p:nvSpPr>
+        <p:spPr>
+          <a:xfrm>
+            <a:off x="685800" y="1143000"/>
+            <a:ext cx="5486400" cy="3086100"/>
+          </a:xfrm>
+          <a:custGeom>
+            <a:avLst/>
+            <a:gdLst/>
+            <a:ahLst/>
+            <a:cxnLst/>
+            <a:rect l="l" t="t" r="r" b="b"/>
+            <a:pathLst>
+              <a:path w="120000" h="120000" extrusionOk="0">
+                <a:moveTo>
+                  <a:pt x="0" y="0"/>
+                </a:moveTo>
+                <a:lnTo>
+                  <a:pt x="120000" y="0"/>
+                </a:lnTo>
+                <a:lnTo>
+                  <a:pt x="120000" y="120000"/>
+                </a:lnTo>
+                <a:lnTo>
+                  <a:pt x="0" y="120000"/>
+                </a:lnTo>
+                <a:close/>
+              </a:path>
+            </a:pathLst>
+          </a:custGeom>
+          <a:noFill/>
+          <a:ln w="12700" cap="flat" cmpd="sng">
+            <a:solidFill>
+              <a:srgbClr val="000000"/>
+            </a:solidFill>
+            <a:prstDash val="solid"/>
+            <a:round/>
+            <a:headEnd type="none" w="sm" len="sm"/>
+            <a:tailEnd type="none" w="sm" len="sm"/>
+          </a:ln>
+        </p:spPr>
+      </p:sp>
+      <p:sp>
+        <p:nvSpPr>
+          <p:cNvPr id="117" name="Google Shape;117;gf7a5f07be5_0_13:notes"/>
+          <p:cNvSpPr txBox="1">
+            <a:spLocks noGrp="1"/>
+          </p:cNvSpPr>
+          <p:nvPr>
+            <p:ph type="body" idx="1"/>
+          </p:nvPr>
+        </p:nvSpPr>
+        <p:spPr>
+          <a:xfrm>
+            <a:off x="685800" y="4400550"/>
+            <a:ext cx="5486400" cy="3600600"/>
+          </a:xfrm>
+          <a:prstGeom prst="rect">
+            <a:avLst/>
+          </a:prstGeom>
+          <a:noFill/>
+          <a:ln>
+            <a:noFill/>
+          </a:ln>
+        </p:spPr>
+        <p:txBody>
+          <a:bodyPr spcFirstLastPara="1" wrap="square" lIns="91425" tIns="45700" rIns="91425" bIns="45700" anchor="t" anchorCtr="0">
+            <a:noAutofit/>
+          </a:bodyPr>
+          <a:lstStyle/>
+          <a:p>
+            <a:pPr marL="0" lvl="0" indent="0" algn="l" rtl="0">
+              <a:spcBef>
+                <a:spcPts val="0"/>
+              </a:spcBef>
+              <a:spcAft>
+                <a:spcPts val="0"/>
+              </a:spcAft>
+              <a:buNone/>
+            </a:pPr>
+            <a:endParaRPr/>
+          </a:p>
+        </p:txBody>
+      </p:sp>
+      <p:sp>
+        <p:nvSpPr>
+          <p:cNvPr id="118" name="Google Shape;118;gf7a5f07be5_0_13:notes"/>
+          <p:cNvSpPr txBox="1">
+            <a:spLocks noGrp="1"/>
+          </p:cNvSpPr>
+          <p:nvPr>
+            <p:ph type="sldNum" idx="12"/>
+          </p:nvPr>
+        </p:nvSpPr>
+        <p:spPr>
+          <a:xfrm>
+            <a:off x="3884613" y="8685213"/>
+            <a:ext cx="2971800" cy="458700"/>
+          </a:xfrm>
+          <a:prstGeom prst="rect">
+            <a:avLst/>
+          </a:prstGeom>
+          <a:noFill/>
+          <a:ln>
+            <a:noFill/>
+          </a:ln>
+        </p:spPr>
+        <p:txBody>
+          <a:bodyPr spcFirstLastPara="1" wrap="square" lIns="91425" tIns="45700" rIns="91425" bIns="45700" anchor="b" anchorCtr="0">
+            <a:noAutofit/>
+          </a:bodyPr>
+          <a:lstStyle/>
+          <a:p>
+            <a:pPr marL="0" lvl="0" indent="0" algn="r" rtl="0">
+              <a:spcBef>
+                <a:spcPts val="0"/>
+              </a:spcBef>
+              <a:spcAft>
+                <a:spcPts val="0"/>
+              </a:spcAft>
+              <a:buNone/>
+            </a:pPr>
+            <a:fld id="{00000000-1234-1234-1234-123412341234}" type="slidenum">
+              <a:rPr lang="en-US"/>
+              <a:t>10</a:t>
+            </a:fld>
+            <a:endParaRPr/>
+          </a:p>
+        </p:txBody>
+      </p:sp>
+    </p:spTree>
+  </p:cSld>
+  <p:clrMapOvr>
+    <a:masterClrMapping/>
+  </p:clrMapOvr>
+</p:notes>
+</file>
+
 <file path=ppt/notesSlides/notesSlide2.xml><?xml version="1.0" encoding="utf-8"?>
 <p:notes xmlns:a="http://schemas.openxmlformats.org/drawingml/2006/main" xmlns:r="http://schemas.openxmlformats.org/officeDocument/2006/relationships" xmlns:p="http://schemas.openxmlformats.org/presentationml/2006/main" showMasterSp="0" showMasterPhAnim="0">
   <p:cSld>
@@ -2724,7 +2889,7 @@
     </p:spTree>
     <p:extLst>
       <p:ext uri="{BB962C8B-B14F-4D97-AF65-F5344CB8AC3E}">
-        <p14:creationId xmlns:p14="http://schemas.microsoft.com/office/powerpoint/2010/main" val="3491450082"/>
+        <p14:creationId xmlns:p14="http://schemas.microsoft.com/office/powerpoint/2010/main" val="2750172267"/>
       </p:ext>
     </p:extLst>
   </p:cSld>
@@ -2739,7 +2904,7 @@
   <p:cSld>
     <p:spTree>
       <p:nvGrpSpPr>
-        <p:cNvPr id="1" name="Shape 115"/>
+        <p:cNvPr id="1" name="Shape 108"/>
         <p:cNvGrpSpPr/>
         <p:nvPr/>
       </p:nvGrpSpPr>
@@ -2753,7 +2918,7 @@
       </p:grpSpPr>
       <p:sp>
         <p:nvSpPr>
-          <p:cNvPr id="116" name="Google Shape;116;gf7a5f07be5_0_13:notes"/>
+          <p:cNvPr id="109" name="Google Shape;109;gf7a5f07be5_0_6:notes"/>
           <p:cNvSpPr>
             <a:spLocks noGrp="1" noRot="1" noChangeAspect="1"/>
           </p:cNvSpPr>
@@ -2804,7 +2969,7 @@
       </p:sp>
       <p:sp>
         <p:nvSpPr>
-          <p:cNvPr id="117" name="Google Shape;117;gf7a5f07be5_0_13:notes"/>
+          <p:cNvPr id="110" name="Google Shape;110;gf7a5f07be5_0_6:notes"/>
           <p:cNvSpPr txBox="1">
             <a:spLocks noGrp="1"/>
           </p:cNvSpPr>
@@ -2846,7 +3011,7 @@
       </p:sp>
       <p:sp>
         <p:nvSpPr>
-          <p:cNvPr id="118" name="Google Shape;118;gf7a5f07be5_0_13:notes"/>
+          <p:cNvPr id="111" name="Google Shape;111;gf7a5f07be5_0_6:notes"/>
           <p:cNvSpPr txBox="1">
             <a:spLocks noGrp="1"/>
           </p:cNvSpPr>
@@ -2891,6 +3056,11 @@
         </p:txBody>
       </p:sp>
     </p:spTree>
+    <p:extLst>
+      <p:ext uri="{BB962C8B-B14F-4D97-AF65-F5344CB8AC3E}">
+        <p14:creationId xmlns:p14="http://schemas.microsoft.com/office/powerpoint/2010/main" val="3491450082"/>
+      </p:ext>
+    </p:extLst>
   </p:cSld>
   <p:clrMapOvr>
     <a:masterClrMapping/>
@@ -13686,6 +13856,188 @@
 </p:sld>
 </file>
 
+<file path=ppt/slides/slide10.xml><?xml version="1.0" encoding="utf-8"?>
+<p:sld xmlns:a="http://schemas.openxmlformats.org/drawingml/2006/main" xmlns:r="http://schemas.openxmlformats.org/officeDocument/2006/relationships" xmlns:p="http://schemas.openxmlformats.org/presentationml/2006/main">
+  <p:cSld>
+    <p:spTree>
+      <p:nvGrpSpPr>
+        <p:cNvPr id="1" name="Shape 119"/>
+        <p:cNvGrpSpPr/>
+        <p:nvPr/>
+      </p:nvGrpSpPr>
+      <p:grpSpPr>
+        <a:xfrm>
+          <a:off x="0" y="0"/>
+          <a:ext cx="0" cy="0"/>
+          <a:chOff x="0" y="0"/>
+          <a:chExt cx="0" cy="0"/>
+        </a:xfrm>
+      </p:grpSpPr>
+      <p:sp>
+        <p:nvSpPr>
+          <p:cNvPr id="120" name="Google Shape;120;p17"/>
+          <p:cNvSpPr txBox="1"/>
+          <p:nvPr/>
+        </p:nvSpPr>
+        <p:spPr>
+          <a:xfrm>
+            <a:off x="2982900" y="1739575"/>
+            <a:ext cx="3178200" cy="1477500"/>
+          </a:xfrm>
+          <a:prstGeom prst="rect">
+            <a:avLst/>
+          </a:prstGeom>
+          <a:noFill/>
+          <a:ln>
+            <a:noFill/>
+          </a:ln>
+        </p:spPr>
+        <p:txBody>
+          <a:bodyPr spcFirstLastPara="1" wrap="square" lIns="91425" tIns="91425" rIns="91425" bIns="91425" anchor="t" anchorCtr="0">
+            <a:spAutoFit/>
+          </a:bodyPr>
+          <a:lstStyle/>
+          <a:p>
+            <a:pPr marL="0" lvl="0" indent="0" algn="ctr" rtl="0">
+              <a:spcBef>
+                <a:spcPts val="0"/>
+              </a:spcBef>
+              <a:spcAft>
+                <a:spcPts val="0"/>
+              </a:spcAft>
+              <a:buNone/>
+            </a:pPr>
+            <a:r>
+              <a:rPr lang="en-US" sz="2800" b="1">
+                <a:solidFill>
+                  <a:srgbClr val="E56618"/>
+                </a:solidFill>
+              </a:rPr>
+              <a:t>Questions? </a:t>
+            </a:r>
+            <a:endParaRPr sz="2800" b="1">
+              <a:solidFill>
+                <a:srgbClr val="E56618"/>
+              </a:solidFill>
+            </a:endParaRPr>
+          </a:p>
+          <a:p>
+            <a:pPr marL="0" lvl="0" indent="0" algn="ctr" rtl="0">
+              <a:spcBef>
+                <a:spcPts val="0"/>
+              </a:spcBef>
+              <a:spcAft>
+                <a:spcPts val="0"/>
+              </a:spcAft>
+              <a:buNone/>
+            </a:pPr>
+            <a:endParaRPr sz="2800" b="1">
+              <a:solidFill>
+                <a:srgbClr val="E56618"/>
+              </a:solidFill>
+            </a:endParaRPr>
+          </a:p>
+          <a:p>
+            <a:pPr marL="0" lvl="0" indent="0" algn="ctr" rtl="0">
+              <a:spcBef>
+                <a:spcPts val="0"/>
+              </a:spcBef>
+              <a:spcAft>
+                <a:spcPts val="0"/>
+              </a:spcAft>
+              <a:buNone/>
+            </a:pPr>
+            <a:r>
+              <a:rPr lang="en-US" sz="2800" b="1">
+                <a:solidFill>
+                  <a:srgbClr val="E56618"/>
+                </a:solidFill>
+              </a:rPr>
+              <a:t>Thank you!</a:t>
+            </a:r>
+            <a:endParaRPr sz="2800" b="1">
+              <a:solidFill>
+                <a:srgbClr val="E56618"/>
+              </a:solidFill>
+            </a:endParaRPr>
+          </a:p>
+        </p:txBody>
+      </p:sp>
+      <p:sp>
+        <p:nvSpPr>
+          <p:cNvPr id="2" name="TextBox 1">
+            <a:extLst>
+              <a:ext uri="{FF2B5EF4-FFF2-40B4-BE49-F238E27FC236}">
+                <a16:creationId xmlns:a16="http://schemas.microsoft.com/office/drawing/2014/main" id="{790A942E-AE3F-4129-B853-D1BC099C8E6F}"/>
+              </a:ext>
+            </a:extLst>
+          </p:cNvPr>
+          <p:cNvSpPr txBox="1"/>
+          <p:nvPr/>
+        </p:nvSpPr>
+        <p:spPr>
+          <a:xfrm>
+            <a:off x="83592" y="4206910"/>
+            <a:ext cx="9012996" cy="784830"/>
+          </a:xfrm>
+          <a:prstGeom prst="rect">
+            <a:avLst/>
+          </a:prstGeom>
+          <a:noFill/>
+        </p:spPr>
+        <p:txBody>
+          <a:bodyPr wrap="square" rtlCol="0">
+            <a:spAutoFit/>
+          </a:bodyPr>
+          <a:lstStyle/>
+          <a:p>
+            <a:r>
+              <a:rPr lang="en-US" sz="900" dirty="0"/>
+              <a:t>Robot image : </a:t>
+            </a:r>
+            <a:r>
+              <a:rPr lang="en-US" sz="900" dirty="0">
+                <a:hlinkClick r:id="rId3"/>
+              </a:rPr>
+              <a:t>https://www.pinclipart.com/downpngs/xJhhx_vector-blueprint-robot-vector-freeuse-stock-computer-robotics/</a:t>
+            </a:r>
+            <a:endParaRPr lang="en-US" sz="900" dirty="0"/>
+          </a:p>
+          <a:p>
+            <a:r>
+              <a:rPr lang="en-US" sz="900" dirty="0"/>
+              <a:t>ReLU : </a:t>
+            </a:r>
+            <a:r>
+              <a:rPr lang="en-US" sz="900" dirty="0">
+                <a:hlinkClick r:id="rId4"/>
+              </a:rPr>
+              <a:t>https://machinelearningmastery.com/wp-content/uploads/2018/10/Line-Plot-of-Rectified-Linear-Activation-for-Negative-and-Positive-Inputs.png</a:t>
+            </a:r>
+            <a:endParaRPr lang="en-US" sz="900" dirty="0"/>
+          </a:p>
+          <a:p>
+            <a:r>
+              <a:rPr lang="en-US" sz="900" dirty="0">
+                <a:hlinkClick r:id="rId5"/>
+              </a:rPr>
+              <a:t>https://www.researchgate.net/profile/Jesper-Dramsch/publication/342435907/figure/fig3/AS:906156654469121@1593055990865/ReLU-activation-red-and-derivative-blue-for-efficient-gradient-computation.ppm</a:t>
+            </a:r>
+            <a:endParaRPr lang="en-US" sz="900" dirty="0"/>
+          </a:p>
+          <a:p>
+            <a:endParaRPr lang="en-US" sz="900" dirty="0"/>
+          </a:p>
+        </p:txBody>
+      </p:sp>
+    </p:spTree>
+  </p:cSld>
+  <p:clrMapOvr>
+    <a:masterClrMapping/>
+  </p:clrMapOvr>
+</p:sld>
+</file>
+
 <file path=ppt/slides/slide2.xml><?xml version="1.0" encoding="utf-8"?>
 <p:sld xmlns:a="http://schemas.openxmlformats.org/drawingml/2006/main" xmlns:r="http://schemas.openxmlformats.org/officeDocument/2006/relationships" xmlns:p="http://schemas.openxmlformats.org/presentationml/2006/main">
   <p:cSld>
@@ -14609,8 +14961,8 @@
         </p:nvSpPr>
         <p:spPr>
           <a:xfrm>
-            <a:off x="4088083" y="2519105"/>
-            <a:ext cx="982961" cy="523220"/>
+            <a:off x="4023449" y="2449702"/>
+            <a:ext cx="1244251" cy="523220"/>
           </a:xfrm>
           <a:prstGeom prst="rect">
             <a:avLst/>
@@ -14629,7 +14981,7 @@
                   <a:schemeClr val="tx1"/>
                 </a:solidFill>
               </a:rPr>
-              <a:t>So…</a:t>
+              <a:t>then…</a:t>
             </a:r>
           </a:p>
         </p:txBody>
@@ -15011,6 +15363,56 @@
           </a:p>
         </p:txBody>
       </p:sp>
+      <p:sp>
+        <p:nvSpPr>
+          <p:cNvPr id="51" name="TextBox 50">
+            <a:extLst>
+              <a:ext uri="{FF2B5EF4-FFF2-40B4-BE49-F238E27FC236}">
+                <a16:creationId xmlns:a16="http://schemas.microsoft.com/office/drawing/2014/main" id="{CBCA85AC-F779-4CA1-B1F7-0941DAE09FD1}"/>
+              </a:ext>
+            </a:extLst>
+          </p:cNvPr>
+          <p:cNvSpPr txBox="1"/>
+          <p:nvPr/>
+        </p:nvSpPr>
+        <p:spPr>
+          <a:xfrm>
+            <a:off x="3459461" y="1449418"/>
+            <a:ext cx="458780" cy="338554"/>
+          </a:xfrm>
+          <a:prstGeom prst="rect">
+            <a:avLst/>
+          </a:prstGeom>
+          <a:noFill/>
+        </p:spPr>
+        <p:txBody>
+          <a:bodyPr wrap="none" rtlCol="0">
+            <a:spAutoFit/>
+          </a:bodyPr>
+          <a:lstStyle/>
+          <a:p>
+            <a:r>
+              <a:rPr lang="en-US" sz="1600" dirty="0">
+                <a:solidFill>
+                  <a:schemeClr val="bg1"/>
+                </a:solidFill>
+                <a:highlight>
+                  <a:srgbClr val="000000"/>
+                </a:highlight>
+              </a:rPr>
+              <a:t>G1</a:t>
+            </a:r>
+            <a:endParaRPr lang="en-US" sz="2800" dirty="0">
+              <a:solidFill>
+                <a:schemeClr val="bg1"/>
+              </a:solidFill>
+              <a:highlight>
+                <a:srgbClr val="000000"/>
+              </a:highlight>
+            </a:endParaRPr>
+          </a:p>
+        </p:txBody>
+      </p:sp>
     </p:spTree>
   </p:cSld>
   <p:clrMapOvr>
@@ -15141,52 +15543,6 @@
       </p:sp>
       <p:sp>
         <p:nvSpPr>
-          <p:cNvPr id="2" name="Rectangle 1">
-            <a:extLst>
-              <a:ext uri="{FF2B5EF4-FFF2-40B4-BE49-F238E27FC236}">
-                <a16:creationId xmlns:a16="http://schemas.microsoft.com/office/drawing/2014/main" id="{4459D4AE-CAA3-4CC2-8FB2-FA19061347E9}"/>
-              </a:ext>
-            </a:extLst>
-          </p:cNvPr>
-          <p:cNvSpPr/>
-          <p:nvPr/>
-        </p:nvSpPr>
-        <p:spPr>
-          <a:xfrm>
-            <a:off x="608179" y="1356527"/>
-            <a:ext cx="2602523" cy="2803490"/>
-          </a:xfrm>
-          <a:prstGeom prst="rect">
-            <a:avLst/>
-          </a:prstGeom>
-        </p:spPr>
-        <p:style>
-          <a:lnRef idx="2">
-            <a:schemeClr val="accent1">
-              <a:shade val="50000"/>
-            </a:schemeClr>
-          </a:lnRef>
-          <a:fillRef idx="1">
-            <a:schemeClr val="accent1"/>
-          </a:fillRef>
-          <a:effectRef idx="0">
-            <a:schemeClr val="accent1"/>
-          </a:effectRef>
-          <a:fontRef idx="minor">
-            <a:schemeClr val="lt1"/>
-          </a:fontRef>
-        </p:style>
-        <p:txBody>
-          <a:bodyPr rtlCol="0" anchor="ctr"/>
-          <a:lstStyle/>
-          <a:p>
-            <a:pPr algn="ctr"/>
-            <a:endParaRPr lang="en-US"/>
-          </a:p>
-        </p:txBody>
-      </p:sp>
-      <p:sp>
-        <p:nvSpPr>
           <p:cNvPr id="3" name="TextBox 2">
             <a:extLst>
               <a:ext uri="{FF2B5EF4-FFF2-40B4-BE49-F238E27FC236}">
@@ -15199,8 +15555,8 @@
         </p:nvSpPr>
         <p:spPr>
           <a:xfrm>
-            <a:off x="3336053" y="1356527"/>
-            <a:ext cx="5199768" cy="1600438"/>
+            <a:off x="176100" y="1379100"/>
+            <a:ext cx="5199768" cy="2893100"/>
           </a:xfrm>
           <a:prstGeom prst="rect">
             <a:avLst/>
@@ -15215,8 +15571,11 @@
           <a:p>
             <a:r>
               <a:rPr lang="en-US" dirty="0"/>
-              <a:t>Alex Lamarche</a:t>
+              <a:t>Alexander Lamarche</a:t>
             </a:r>
+          </a:p>
+          <a:p>
+            <a:endParaRPr lang="en-US" dirty="0"/>
           </a:p>
           <a:p>
             <a:endParaRPr lang="en-US" dirty="0"/>
@@ -15228,8 +15587,20 @@
             </a:r>
             <a:r>
               <a:rPr lang="en-US" dirty="0"/>
-              <a:t> Undergraduate Software Eng. Mix, final year</a:t>
+              <a:t> </a:t>
             </a:r>
+          </a:p>
+          <a:p>
+            <a:endParaRPr lang="en-US" dirty="0"/>
+          </a:p>
+          <a:p>
+            <a:r>
+              <a:rPr lang="en-US" dirty="0"/>
+              <a:t>SOIS Undergraduate Software Eng. Mix - currently in final year</a:t>
+            </a:r>
+          </a:p>
+          <a:p>
+            <a:endParaRPr lang="en-US" dirty="0"/>
           </a:p>
           <a:p>
             <a:endParaRPr lang="en-US" dirty="0"/>
@@ -15248,18 +15619,51 @@
             <a:endParaRPr lang="en-US" b="1" dirty="0"/>
           </a:p>
           <a:p>
+            <a:endParaRPr lang="en-US" b="1" dirty="0"/>
+          </a:p>
+          <a:p>
             <a:r>
               <a:rPr lang="en-US" b="1" dirty="0"/>
               <a:t>Weaknesses: </a:t>
             </a:r>
             <a:r>
               <a:rPr lang="en-US" dirty="0"/>
-              <a:t>mathematical modeling of systems</a:t>
+              <a:t>mathematical modeling of systems (reason for project)</a:t>
             </a:r>
             <a:endParaRPr lang="en-US" b="1" dirty="0"/>
           </a:p>
         </p:txBody>
       </p:sp>
+      <p:pic>
+        <p:nvPicPr>
+          <p:cNvPr id="7" name="Picture 6" descr="A picture containing person, outdoor, standing, crowd&#10;&#10;Description automatically generated">
+            <a:extLst>
+              <a:ext uri="{FF2B5EF4-FFF2-40B4-BE49-F238E27FC236}">
+                <a16:creationId xmlns:a16="http://schemas.microsoft.com/office/drawing/2014/main" id="{A9D2B22D-D29F-4356-BE45-F455A749EC52}"/>
+              </a:ext>
+            </a:extLst>
+          </p:cNvPr>
+          <p:cNvPicPr>
+            <a:picLocks noChangeAspect="1"/>
+          </p:cNvPicPr>
+          <p:nvPr/>
+        </p:nvPicPr>
+        <p:blipFill>
+          <a:blip r:embed="rId3"/>
+          <a:stretch>
+            <a:fillRect/>
+          </a:stretch>
+        </p:blipFill>
+        <p:spPr>
+          <a:xfrm>
+            <a:off x="5780060" y="625483"/>
+            <a:ext cx="2627844" cy="3941767"/>
+          </a:xfrm>
+          <a:prstGeom prst="rect">
+            <a:avLst/>
+          </a:prstGeom>
+        </p:spPr>
+      </p:pic>
     </p:spTree>
   </p:cSld>
   <p:clrMapOvr>
@@ -15402,7 +15806,7 @@
         </p:nvSpPr>
         <p:spPr>
           <a:xfrm>
-            <a:off x="494153" y="1191850"/>
+            <a:off x="409872" y="1274629"/>
             <a:ext cx="2670313" cy="1169551"/>
           </a:xfrm>
           <a:prstGeom prst="rect">
@@ -15470,7 +15874,7 @@
         </p:nvSpPr>
         <p:spPr>
           <a:xfrm>
-            <a:off x="494152" y="2689346"/>
+            <a:off x="409873" y="2647629"/>
             <a:ext cx="2670313" cy="1600438"/>
           </a:xfrm>
           <a:prstGeom prst="rect">
@@ -15530,6 +15934,136 @@
             <a:r>
               <a:rPr lang="en-US" dirty="0"/>
               <a:t>Swapping Pools</a:t>
+            </a:r>
+          </a:p>
+        </p:txBody>
+      </p:sp>
+      <p:pic>
+        <p:nvPicPr>
+          <p:cNvPr id="9" name="Picture 8" descr="Text&#10;&#10;Description automatically generated">
+            <a:extLst>
+              <a:ext uri="{FF2B5EF4-FFF2-40B4-BE49-F238E27FC236}">
+                <a16:creationId xmlns:a16="http://schemas.microsoft.com/office/drawing/2014/main" id="{D7456A00-6B60-4148-AFE4-2412A3B42655}"/>
+              </a:ext>
+            </a:extLst>
+          </p:cNvPr>
+          <p:cNvPicPr>
+            <a:picLocks noChangeAspect="1"/>
+          </p:cNvPicPr>
+          <p:nvPr/>
+        </p:nvPicPr>
+        <p:blipFill>
+          <a:blip r:embed="rId3"/>
+          <a:stretch>
+            <a:fillRect/>
+          </a:stretch>
+        </p:blipFill>
+        <p:spPr>
+          <a:xfrm>
+            <a:off x="3269888" y="1768541"/>
+            <a:ext cx="2915057" cy="2981741"/>
+          </a:xfrm>
+          <a:prstGeom prst="rect">
+            <a:avLst/>
+          </a:prstGeom>
+        </p:spPr>
+      </p:pic>
+      <p:sp>
+        <p:nvSpPr>
+          <p:cNvPr id="10" name="TextBox 9">
+            <a:extLst>
+              <a:ext uri="{FF2B5EF4-FFF2-40B4-BE49-F238E27FC236}">
+                <a16:creationId xmlns:a16="http://schemas.microsoft.com/office/drawing/2014/main" id="{A245E00C-F67D-4EF3-A839-0266A1360444}"/>
+              </a:ext>
+            </a:extLst>
+          </p:cNvPr>
+          <p:cNvSpPr txBox="1"/>
+          <p:nvPr/>
+        </p:nvSpPr>
+        <p:spPr>
+          <a:xfrm>
+            <a:off x="4254406" y="1460764"/>
+            <a:ext cx="811441" cy="307777"/>
+          </a:xfrm>
+          <a:prstGeom prst="rect">
+            <a:avLst/>
+          </a:prstGeom>
+          <a:noFill/>
+        </p:spPr>
+        <p:txBody>
+          <a:bodyPr wrap="none" rtlCol="0">
+            <a:spAutoFit/>
+          </a:bodyPr>
+          <a:lstStyle/>
+          <a:p>
+            <a:r>
+              <a:rPr lang="en-US" dirty="0"/>
+              <a:t>main.py</a:t>
+            </a:r>
+          </a:p>
+        </p:txBody>
+      </p:sp>
+      <p:pic>
+        <p:nvPicPr>
+          <p:cNvPr id="12" name="Picture 11" descr="Text&#10;&#10;Description automatically generated">
+            <a:extLst>
+              <a:ext uri="{FF2B5EF4-FFF2-40B4-BE49-F238E27FC236}">
+                <a16:creationId xmlns:a16="http://schemas.microsoft.com/office/drawing/2014/main" id="{156AE9CC-CF9F-4584-840B-C387EAF3BB00}"/>
+              </a:ext>
+            </a:extLst>
+          </p:cNvPr>
+          <p:cNvPicPr>
+            <a:picLocks noChangeAspect="1"/>
+          </p:cNvPicPr>
+          <p:nvPr/>
+        </p:nvPicPr>
+        <p:blipFill>
+          <a:blip r:embed="rId4"/>
+          <a:stretch>
+            <a:fillRect/>
+          </a:stretch>
+        </p:blipFill>
+        <p:spPr>
+          <a:xfrm>
+            <a:off x="6225404" y="138078"/>
+            <a:ext cx="2885906" cy="4612204"/>
+          </a:xfrm>
+          <a:prstGeom prst="rect">
+            <a:avLst/>
+          </a:prstGeom>
+        </p:spPr>
+      </p:pic>
+      <p:sp>
+        <p:nvSpPr>
+          <p:cNvPr id="15" name="TextBox 14">
+            <a:extLst>
+              <a:ext uri="{FF2B5EF4-FFF2-40B4-BE49-F238E27FC236}">
+                <a16:creationId xmlns:a16="http://schemas.microsoft.com/office/drawing/2014/main" id="{021D5BD1-DFBA-4F51-ADDE-BCF14151DDC3}"/>
+              </a:ext>
+            </a:extLst>
+          </p:cNvPr>
+          <p:cNvSpPr txBox="1"/>
+          <p:nvPr/>
+        </p:nvSpPr>
+        <p:spPr>
+          <a:xfrm>
+            <a:off x="4924041" y="45648"/>
+            <a:ext cx="1369286" cy="307777"/>
+          </a:xfrm>
+          <a:prstGeom prst="rect">
+            <a:avLst/>
+          </a:prstGeom>
+          <a:noFill/>
+        </p:spPr>
+        <p:txBody>
+          <a:bodyPr wrap="none" rtlCol="0">
+            <a:spAutoFit/>
+          </a:bodyPr>
+          <a:lstStyle/>
+          <a:p>
+            <a:r>
+              <a:rPr lang="en-US" dirty="0"/>
+              <a:t>convolution.py</a:t>
             </a:r>
           </a:p>
         </p:txBody>
@@ -15927,8 +16461,8 @@
           </a:ln>
         </p:spPr>
       </p:pic>
-      <mc:AlternateContent xmlns:mc="http://schemas.openxmlformats.org/markup-compatibility/2006">
-        <mc:Choice xmlns:a14="http://schemas.microsoft.com/office/drawing/2010/main" Requires="a14">
+      <mc:AlternateContent xmlns:mc="http://schemas.openxmlformats.org/markup-compatibility/2006" xmlns:a14="http://schemas.microsoft.com/office/drawing/2010/main">
+        <mc:Choice Requires="a14">
           <p:sp>
             <p:nvSpPr>
               <p:cNvPr id="14" name="TextBox 13">
@@ -15957,6 +16491,7 @@
               </a:bodyPr>
               <a:lstStyle/>
               <a:p>
+                <a:pPr/>
                 <a14:m>
                   <m:oMathPara xmlns:m="http://schemas.openxmlformats.org/officeDocument/2006/math">
                     <m:oMathParaPr>
@@ -15988,7 +16523,13 @@
                               <a:rPr lang="en-US" b="0" i="1" smtClean="0">
                                 <a:latin typeface="Cambria Math" panose="02040503050406030204" pitchFamily="18" charset="0"/>
                               </a:rPr>
-                              <m:t>      2</m:t>
+                              <m:t> </m:t>
+                            </m:r>
+                            <m:r>
+                              <a:rPr lang="en-US" b="0" i="1" smtClean="0">
+                                <a:latin typeface="Cambria Math" panose="02040503050406030204" pitchFamily="18" charset="0"/>
+                              </a:rPr>
+                              <m:t>     2</m:t>
                             </m:r>
                           </m:e>
                           <m:e>
@@ -16069,7 +16610,7 @@
             </p:txBody>
           </p:sp>
         </mc:Choice>
-        <mc:Fallback>
+        <mc:Fallback xmlns="">
           <p:sp>
             <p:nvSpPr>
               <p:cNvPr id="14" name="TextBox 13">
@@ -16254,8 +16795,8 @@
           </a:p>
         </p:txBody>
       </p:sp>
-      <mc:AlternateContent xmlns:mc="http://schemas.openxmlformats.org/markup-compatibility/2006">
-        <mc:Choice xmlns:a14="http://schemas.microsoft.com/office/drawing/2010/main" Requires="a14">
+      <mc:AlternateContent xmlns:mc="http://schemas.openxmlformats.org/markup-compatibility/2006" xmlns:a14="http://schemas.microsoft.com/office/drawing/2010/main">
+        <mc:Choice Requires="a14">
           <p:sp>
             <p:nvSpPr>
               <p:cNvPr id="20" name="TextBox 19">
@@ -16284,6 +16825,7 @@
               </a:bodyPr>
               <a:lstStyle/>
               <a:p>
+                <a:pPr/>
                 <a14:m>
                   <m:oMathPara xmlns:m="http://schemas.openxmlformats.org/officeDocument/2006/math">
                     <m:oMathParaPr>
@@ -16315,7 +16857,13 @@
                               <a:rPr lang="en-US" b="0" i="1" smtClean="0">
                                 <a:latin typeface="Cambria Math" panose="02040503050406030204" pitchFamily="18" charset="0"/>
                               </a:rPr>
-                              <m:t>   −2  </m:t>
+                              <m:t> </m:t>
+                            </m:r>
+                            <m:r>
+                              <a:rPr lang="en-US" b="0" i="1" smtClean="0">
+                                <a:latin typeface="Cambria Math" panose="02040503050406030204" pitchFamily="18" charset="0"/>
+                              </a:rPr>
+                              <m:t>  −2  </m:t>
                             </m:r>
                           </m:e>
                           <m:e>
@@ -16396,7 +16944,7 @@
             </p:txBody>
           </p:sp>
         </mc:Choice>
-        <mc:Fallback>
+        <mc:Fallback xmlns="">
           <p:sp>
             <p:nvSpPr>
               <p:cNvPr id="20" name="TextBox 19">
@@ -16581,8 +17129,8 @@
           </a:p>
         </p:txBody>
       </p:sp>
-      <mc:AlternateContent xmlns:mc="http://schemas.openxmlformats.org/markup-compatibility/2006">
-        <mc:Choice xmlns:a14="http://schemas.microsoft.com/office/drawing/2010/main" Requires="a14">
+      <mc:AlternateContent xmlns:mc="http://schemas.openxmlformats.org/markup-compatibility/2006" xmlns:a14="http://schemas.microsoft.com/office/drawing/2010/main">
+        <mc:Choice Requires="a14">
           <p:sp>
             <p:nvSpPr>
               <p:cNvPr id="26" name="TextBox 25">
@@ -16611,6 +17159,7 @@
               </a:bodyPr>
               <a:lstStyle/>
               <a:p>
+                <a:pPr/>
                 <a14:m>
                   <m:oMathPara xmlns:m="http://schemas.openxmlformats.org/officeDocument/2006/math">
                     <m:oMathParaPr>
@@ -16642,7 +17191,13 @@
                               <a:rPr lang="en-US" b="0" i="1" smtClean="0">
                                 <a:latin typeface="Cambria Math" panose="02040503050406030204" pitchFamily="18" charset="0"/>
                               </a:rPr>
-                              <m:t>   −2</m:t>
+                              <m:t> </m:t>
+                            </m:r>
+                            <m:r>
+                              <a:rPr lang="en-US" b="0" i="1" smtClean="0">
+                                <a:latin typeface="Cambria Math" panose="02040503050406030204" pitchFamily="18" charset="0"/>
+                              </a:rPr>
+                              <m:t>  −2</m:t>
                             </m:r>
                           </m:e>
                           <m:e>
@@ -16723,7 +17278,7 @@
             </p:txBody>
           </p:sp>
         </mc:Choice>
-        <mc:Fallback>
+        <mc:Fallback xmlns="">
           <p:sp>
             <p:nvSpPr>
               <p:cNvPr id="26" name="TextBox 25">
@@ -16768,8 +17323,8 @@
           </p:sp>
         </mc:Fallback>
       </mc:AlternateContent>
-      <mc:AlternateContent xmlns:mc="http://schemas.openxmlformats.org/markup-compatibility/2006">
-        <mc:Choice xmlns:a14="http://schemas.microsoft.com/office/drawing/2010/main" Requires="a14">
+      <mc:AlternateContent xmlns:mc="http://schemas.openxmlformats.org/markup-compatibility/2006" xmlns:a14="http://schemas.microsoft.com/office/drawing/2010/main">
+        <mc:Choice Requires="a14">
           <p:sp>
             <p:nvSpPr>
               <p:cNvPr id="27" name="TextBox 26">
@@ -16798,6 +17353,7 @@
               </a:bodyPr>
               <a:lstStyle/>
               <a:p>
+                <a:pPr/>
                 <a14:m>
                   <m:oMathPara xmlns:m="http://schemas.openxmlformats.org/officeDocument/2006/math">
                     <m:oMathParaPr>
@@ -16829,7 +17385,13 @@
                               <a:rPr lang="en-US" b="0" i="1" smtClean="0">
                                 <a:latin typeface="Cambria Math" panose="02040503050406030204" pitchFamily="18" charset="0"/>
                               </a:rPr>
-                              <m:t>   2  </m:t>
+                              <m:t> </m:t>
+                            </m:r>
+                            <m:r>
+                              <a:rPr lang="en-US" b="0" i="1" smtClean="0">
+                                <a:latin typeface="Cambria Math" panose="02040503050406030204" pitchFamily="18" charset="0"/>
+                              </a:rPr>
+                              <m:t>  2  </m:t>
                             </m:r>
                           </m:e>
                           <m:e>
@@ -16910,7 +17472,7 @@
             </p:txBody>
           </p:sp>
         </mc:Choice>
-        <mc:Fallback>
+        <mc:Fallback xmlns="">
           <p:sp>
             <p:nvSpPr>
               <p:cNvPr id="27" name="TextBox 26">
@@ -17125,8 +17687,8 @@
           </a:prstGeom>
         </p:spPr>
       </p:pic>
-      <mc:AlternateContent xmlns:mc="http://schemas.openxmlformats.org/markup-compatibility/2006">
-        <mc:Choice xmlns:a14="http://schemas.microsoft.com/office/drawing/2010/main" Requires="a14">
+      <mc:AlternateContent xmlns:mc="http://schemas.openxmlformats.org/markup-compatibility/2006" xmlns:a14="http://schemas.microsoft.com/office/drawing/2010/main">
+        <mc:Choice Requires="a14">
           <p:sp>
             <p:nvSpPr>
               <p:cNvPr id="13" name="TextBox 12">
@@ -17155,6 +17717,7 @@
               </a:bodyPr>
               <a:lstStyle/>
               <a:p>
+                <a:pPr/>
                 <a14:m>
                   <m:oMathPara xmlns:m="http://schemas.openxmlformats.org/officeDocument/2006/math">
                     <m:oMathParaPr>
@@ -17186,7 +17749,13 @@
                               <a:rPr lang="en-US" b="0" i="1" smtClean="0">
                                 <a:latin typeface="Cambria Math" panose="02040503050406030204" pitchFamily="18" charset="0"/>
                               </a:rPr>
-                              <m:t>   0</m:t>
+                              <m:t> </m:t>
+                            </m:r>
+                            <m:r>
+                              <a:rPr lang="en-US" b="0" i="1" smtClean="0">
+                                <a:latin typeface="Cambria Math" panose="02040503050406030204" pitchFamily="18" charset="0"/>
+                              </a:rPr>
+                              <m:t>  0</m:t>
                             </m:r>
                           </m:e>
                           <m:e>
@@ -17267,7 +17836,7 @@
             </p:txBody>
           </p:sp>
         </mc:Choice>
-        <mc:Fallback>
+        <mc:Fallback xmlns="">
           <p:sp>
             <p:nvSpPr>
               <p:cNvPr id="13" name="TextBox 12">
@@ -17514,6 +18083,223 @@
         </p:blipFill>
         <p:spPr>
           <a:xfrm>
+            <a:off x="140178" y="743735"/>
+            <a:ext cx="3319785" cy="2489839"/>
+          </a:xfrm>
+          <a:prstGeom prst="rect">
+            <a:avLst/>
+          </a:prstGeom>
+        </p:spPr>
+      </p:pic>
+      <p:pic>
+        <p:nvPicPr>
+          <p:cNvPr id="3" name="Picture 2" descr="Chart, histogram&#10;&#10;Description automatically generated">
+            <a:extLst>
+              <a:ext uri="{FF2B5EF4-FFF2-40B4-BE49-F238E27FC236}">
+                <a16:creationId xmlns:a16="http://schemas.microsoft.com/office/drawing/2014/main" id="{BF26AEEE-DA22-4B95-AA59-0010E2E7C6E9}"/>
+              </a:ext>
+            </a:extLst>
+          </p:cNvPr>
+          <p:cNvPicPr>
+            <a:picLocks noChangeAspect="1"/>
+          </p:cNvPicPr>
+          <p:nvPr/>
+        </p:nvPicPr>
+        <p:blipFill>
+          <a:blip r:embed="rId4"/>
+          <a:stretch>
+            <a:fillRect/>
+          </a:stretch>
+        </p:blipFill>
+        <p:spPr>
+          <a:xfrm>
+            <a:off x="5684034" y="743734"/>
+            <a:ext cx="3319787" cy="2489840"/>
+          </a:xfrm>
+          <a:prstGeom prst="rect">
+            <a:avLst/>
+          </a:prstGeom>
+        </p:spPr>
+      </p:pic>
+      <p:pic>
+        <p:nvPicPr>
+          <p:cNvPr id="5" name="Picture 4" descr="Chart&#10;&#10;Description automatically generated">
+            <a:extLst>
+              <a:ext uri="{FF2B5EF4-FFF2-40B4-BE49-F238E27FC236}">
+                <a16:creationId xmlns:a16="http://schemas.microsoft.com/office/drawing/2014/main" id="{576960BA-5DC6-4A16-8E89-429C531BB6E1}"/>
+              </a:ext>
+            </a:extLst>
+          </p:cNvPr>
+          <p:cNvPicPr>
+            <a:picLocks noChangeAspect="1"/>
+          </p:cNvPicPr>
+          <p:nvPr/>
+        </p:nvPicPr>
+        <p:blipFill>
+          <a:blip r:embed="rId5"/>
+          <a:stretch>
+            <a:fillRect/>
+          </a:stretch>
+        </p:blipFill>
+        <p:spPr>
+          <a:xfrm>
+            <a:off x="2912107" y="743735"/>
+            <a:ext cx="3319785" cy="2489839"/>
+          </a:xfrm>
+          <a:prstGeom prst="rect">
+            <a:avLst/>
+          </a:prstGeom>
+        </p:spPr>
+      </p:pic>
+      <p:pic>
+        <p:nvPicPr>
+          <p:cNvPr id="1026" name="Picture 2" descr="ReLU activation (red) and derivative (blue) for efficient gradient... |  Download Scientific Diagram">
+            <a:extLst>
+              <a:ext uri="{FF2B5EF4-FFF2-40B4-BE49-F238E27FC236}">
+                <a16:creationId xmlns:a16="http://schemas.microsoft.com/office/drawing/2014/main" id="{81E6F1F1-8559-4E1F-AF80-0102BA78FBD9}"/>
+              </a:ext>
+            </a:extLst>
+          </p:cNvPr>
+          <p:cNvPicPr>
+            <a:picLocks noChangeAspect="1" noChangeArrowheads="1"/>
+          </p:cNvPicPr>
+          <p:nvPr/>
+        </p:nvPicPr>
+        <p:blipFill>
+          <a:blip r:embed="rId6">
+            <a:extLst>
+              <a:ext uri="{28A0092B-C50C-407E-A947-70E740481C1C}">
+                <a14:useLocalDpi xmlns:a14="http://schemas.microsoft.com/office/drawing/2010/main" val="0"/>
+              </a:ext>
+            </a:extLst>
+          </a:blip>
+          <a:srcRect/>
+          <a:stretch>
+            <a:fillRect/>
+          </a:stretch>
+        </p:blipFill>
+        <p:spPr bwMode="auto">
+          <a:xfrm>
+            <a:off x="3388300" y="3233574"/>
+            <a:ext cx="2295734" cy="1353132"/>
+          </a:xfrm>
+          <a:prstGeom prst="rect">
+            <a:avLst/>
+          </a:prstGeom>
+          <a:noFill/>
+          <a:extLst>
+            <a:ext uri="{909E8E84-426E-40DD-AFC4-6F175D3DCCD1}">
+              <a14:hiddenFill xmlns:a14="http://schemas.microsoft.com/office/drawing/2010/main">
+                <a:solidFill>
+                  <a:srgbClr val="FFFFFF"/>
+                </a:solidFill>
+              </a14:hiddenFill>
+            </a:ext>
+          </a:extLst>
+        </p:spPr>
+      </p:pic>
+    </p:spTree>
+    <p:extLst>
+      <p:ext uri="{BB962C8B-B14F-4D97-AF65-F5344CB8AC3E}">
+        <p14:creationId xmlns:p14="http://schemas.microsoft.com/office/powerpoint/2010/main" val="985857275"/>
+      </p:ext>
+    </p:extLst>
+  </p:cSld>
+  <p:clrMapOvr>
+    <a:masterClrMapping/>
+  </p:clrMapOvr>
+</p:sld>
+</file>
+
+<file path=ppt/slides/slide9.xml><?xml version="1.0" encoding="utf-8"?>
+<p:sld xmlns:a="http://schemas.openxmlformats.org/drawingml/2006/main" xmlns:r="http://schemas.openxmlformats.org/officeDocument/2006/relationships" xmlns:p="http://schemas.openxmlformats.org/presentationml/2006/main">
+  <p:cSld>
+    <p:spTree>
+      <p:nvGrpSpPr>
+        <p:cNvPr id="1" name="Shape 112"/>
+        <p:cNvGrpSpPr/>
+        <p:nvPr/>
+      </p:nvGrpSpPr>
+      <p:grpSpPr>
+        <a:xfrm>
+          <a:off x="0" y="0"/>
+          <a:ext cx="0" cy="0"/>
+          <a:chOff x="0" y="0"/>
+          <a:chExt cx="0" cy="0"/>
+        </a:xfrm>
+      </p:grpSpPr>
+      <p:sp>
+        <p:nvSpPr>
+          <p:cNvPr id="113" name="Google Shape;113;p16"/>
+          <p:cNvSpPr txBox="1"/>
+          <p:nvPr/>
+        </p:nvSpPr>
+        <p:spPr>
+          <a:xfrm>
+            <a:off x="0" y="0"/>
+            <a:ext cx="7644000" cy="615600"/>
+          </a:xfrm>
+          <a:prstGeom prst="rect">
+            <a:avLst/>
+          </a:prstGeom>
+          <a:noFill/>
+          <a:ln>
+            <a:noFill/>
+          </a:ln>
+        </p:spPr>
+        <p:txBody>
+          <a:bodyPr spcFirstLastPara="1" wrap="square" lIns="91425" tIns="91425" rIns="91425" bIns="91425" anchor="t" anchorCtr="0">
+            <a:spAutoFit/>
+          </a:bodyPr>
+          <a:lstStyle/>
+          <a:p>
+            <a:pPr marL="0" lvl="0" indent="0" algn="l" rtl="0">
+              <a:spcBef>
+                <a:spcPts val="0"/>
+              </a:spcBef>
+              <a:spcAft>
+                <a:spcPts val="0"/>
+              </a:spcAft>
+              <a:buNone/>
+            </a:pPr>
+            <a:r>
+              <a:rPr lang="en-US" sz="2800" b="1" dirty="0">
+                <a:solidFill>
+                  <a:srgbClr val="E56618"/>
+                </a:solidFill>
+              </a:rPr>
+              <a:t>Demo results cont.</a:t>
+            </a:r>
+            <a:endParaRPr sz="2800" b="1" dirty="0">
+              <a:solidFill>
+                <a:srgbClr val="E56618"/>
+              </a:solidFill>
+            </a:endParaRPr>
+          </a:p>
+        </p:txBody>
+      </p:sp>
+      <p:pic>
+        <p:nvPicPr>
+          <p:cNvPr id="7" name="Picture 6" descr="Chart&#10;&#10;Description automatically generated">
+            <a:extLst>
+              <a:ext uri="{FF2B5EF4-FFF2-40B4-BE49-F238E27FC236}">
+                <a16:creationId xmlns:a16="http://schemas.microsoft.com/office/drawing/2014/main" id="{3D394690-E486-4C97-88E5-80875B75FE2E}"/>
+              </a:ext>
+            </a:extLst>
+          </p:cNvPr>
+          <p:cNvPicPr>
+            <a:picLocks noChangeAspect="1"/>
+          </p:cNvPicPr>
+          <p:nvPr/>
+        </p:nvPicPr>
+        <p:blipFill>
+          <a:blip r:embed="rId3"/>
+          <a:stretch>
+            <a:fillRect/>
+          </a:stretch>
+        </p:blipFill>
+        <p:spPr>
+          <a:xfrm>
             <a:off x="140178" y="1247314"/>
             <a:ext cx="3319785" cy="2489839"/>
           </a:xfrm>
@@ -17544,7 +18330,7 @@
         </p:blipFill>
         <p:spPr>
           <a:xfrm>
-            <a:off x="5625436" y="1247315"/>
+            <a:off x="5625436" y="1247314"/>
             <a:ext cx="3319784" cy="2489839"/>
           </a:xfrm>
           <a:prstGeom prst="rect">
@@ -17588,169 +18374,6 @@
         <p14:creationId xmlns:p14="http://schemas.microsoft.com/office/powerpoint/2010/main" val="3910047634"/>
       </p:ext>
     </p:extLst>
-  </p:cSld>
-  <p:clrMapOvr>
-    <a:masterClrMapping/>
-  </p:clrMapOvr>
-</p:sld>
-</file>
-
-<file path=ppt/slides/slide9.xml><?xml version="1.0" encoding="utf-8"?>
-<p:sld xmlns:a="http://schemas.openxmlformats.org/drawingml/2006/main" xmlns:r="http://schemas.openxmlformats.org/officeDocument/2006/relationships" xmlns:p="http://schemas.openxmlformats.org/presentationml/2006/main">
-  <p:cSld>
-    <p:spTree>
-      <p:nvGrpSpPr>
-        <p:cNvPr id="1" name="Shape 119"/>
-        <p:cNvGrpSpPr/>
-        <p:nvPr/>
-      </p:nvGrpSpPr>
-      <p:grpSpPr>
-        <a:xfrm>
-          <a:off x="0" y="0"/>
-          <a:ext cx="0" cy="0"/>
-          <a:chOff x="0" y="0"/>
-          <a:chExt cx="0" cy="0"/>
-        </a:xfrm>
-      </p:grpSpPr>
-      <p:sp>
-        <p:nvSpPr>
-          <p:cNvPr id="120" name="Google Shape;120;p17"/>
-          <p:cNvSpPr txBox="1"/>
-          <p:nvPr/>
-        </p:nvSpPr>
-        <p:spPr>
-          <a:xfrm>
-            <a:off x="2982900" y="1739575"/>
-            <a:ext cx="3178200" cy="1477500"/>
-          </a:xfrm>
-          <a:prstGeom prst="rect">
-            <a:avLst/>
-          </a:prstGeom>
-          <a:noFill/>
-          <a:ln>
-            <a:noFill/>
-          </a:ln>
-        </p:spPr>
-        <p:txBody>
-          <a:bodyPr spcFirstLastPara="1" wrap="square" lIns="91425" tIns="91425" rIns="91425" bIns="91425" anchor="t" anchorCtr="0">
-            <a:spAutoFit/>
-          </a:bodyPr>
-          <a:lstStyle/>
-          <a:p>
-            <a:pPr marL="0" lvl="0" indent="0" algn="ctr" rtl="0">
-              <a:spcBef>
-                <a:spcPts val="0"/>
-              </a:spcBef>
-              <a:spcAft>
-                <a:spcPts val="0"/>
-              </a:spcAft>
-              <a:buNone/>
-            </a:pPr>
-            <a:r>
-              <a:rPr lang="en-US" sz="2800" b="1">
-                <a:solidFill>
-                  <a:srgbClr val="E56618"/>
-                </a:solidFill>
-              </a:rPr>
-              <a:t>Questions? </a:t>
-            </a:r>
-            <a:endParaRPr sz="2800" b="1">
-              <a:solidFill>
-                <a:srgbClr val="E56618"/>
-              </a:solidFill>
-            </a:endParaRPr>
-          </a:p>
-          <a:p>
-            <a:pPr marL="0" lvl="0" indent="0" algn="ctr" rtl="0">
-              <a:spcBef>
-                <a:spcPts val="0"/>
-              </a:spcBef>
-              <a:spcAft>
-                <a:spcPts val="0"/>
-              </a:spcAft>
-              <a:buNone/>
-            </a:pPr>
-            <a:endParaRPr sz="2800" b="1">
-              <a:solidFill>
-                <a:srgbClr val="E56618"/>
-              </a:solidFill>
-            </a:endParaRPr>
-          </a:p>
-          <a:p>
-            <a:pPr marL="0" lvl="0" indent="0" algn="ctr" rtl="0">
-              <a:spcBef>
-                <a:spcPts val="0"/>
-              </a:spcBef>
-              <a:spcAft>
-                <a:spcPts val="0"/>
-              </a:spcAft>
-              <a:buNone/>
-            </a:pPr>
-            <a:r>
-              <a:rPr lang="en-US" sz="2800" b="1">
-                <a:solidFill>
-                  <a:srgbClr val="E56618"/>
-                </a:solidFill>
-              </a:rPr>
-              <a:t>Thank you!</a:t>
-            </a:r>
-            <a:endParaRPr sz="2800" b="1">
-              <a:solidFill>
-                <a:srgbClr val="E56618"/>
-              </a:solidFill>
-            </a:endParaRPr>
-          </a:p>
-        </p:txBody>
-      </p:sp>
-      <p:sp>
-        <p:nvSpPr>
-          <p:cNvPr id="2" name="TextBox 1">
-            <a:extLst>
-              <a:ext uri="{FF2B5EF4-FFF2-40B4-BE49-F238E27FC236}">
-                <a16:creationId xmlns:a16="http://schemas.microsoft.com/office/drawing/2014/main" id="{790A942E-AE3F-4129-B853-D1BC099C8E6F}"/>
-              </a:ext>
-            </a:extLst>
-          </p:cNvPr>
-          <p:cNvSpPr txBox="1"/>
-          <p:nvPr/>
-        </p:nvSpPr>
-        <p:spPr>
-          <a:xfrm>
-            <a:off x="70339" y="4511710"/>
-            <a:ext cx="7834196" cy="369332"/>
-          </a:xfrm>
-          <a:prstGeom prst="rect">
-            <a:avLst/>
-          </a:prstGeom>
-          <a:noFill/>
-        </p:spPr>
-        <p:txBody>
-          <a:bodyPr wrap="none" rtlCol="0">
-            <a:spAutoFit/>
-          </a:bodyPr>
-          <a:lstStyle/>
-          <a:p>
-            <a:r>
-              <a:rPr lang="en-US" sz="900" dirty="0"/>
-              <a:t>Robot image : </a:t>
-            </a:r>
-            <a:r>
-              <a:rPr lang="en-US" sz="900" dirty="0">
-                <a:hlinkClick r:id="rId3"/>
-              </a:rPr>
-              <a:t>https://www.pinclipart.com/downpngs/xJhhx_vector-blueprint-robot-vector-freeuse-stock-computer-robotics/</a:t>
-            </a:r>
-            <a:endParaRPr lang="en-US" sz="900" dirty="0"/>
-          </a:p>
-          <a:p>
-            <a:r>
-              <a:rPr lang="en-US" sz="900" dirty="0"/>
-              <a:t>ReLU : https://machinelearningmastery.com/wp-content/uploads/2018/10/Line-Plot-of-Rectified-Linear-Activation-for-Negative-and-Positive-Inputs.png</a:t>
-            </a:r>
-          </a:p>
-        </p:txBody>
-      </p:sp>
-    </p:spTree>
   </p:cSld>
   <p:clrMapOvr>
     <a:masterClrMapping/>

</xml_diff>